<commit_message>
linux <-> window dia
</commit_message>
<xml_diff>
--- a/Penguin electronicks.pptx
+++ b/Penguin electronicks.pptx
@@ -5,11 +5,12 @@
     <p:sldMasterId id="2147483648" r:id="rId1"/>
   </p:sldMasterIdLst>
   <p:notesMasterIdLst>
-    <p:notesMasterId r:id="rId4"/>
+    <p:notesMasterId r:id="rId5"/>
   </p:notesMasterIdLst>
   <p:sldIdLst>
     <p:sldId id="256" r:id="rId2"/>
     <p:sldId id="257" r:id="rId3"/>
+    <p:sldId id="258" r:id="rId4"/>
   </p:sldIdLst>
   <p:sldSz cx="12192000" cy="6858000"/>
   <p:notesSz cx="6858000" cy="9144000"/>
@@ -108,6 +109,11 @@
       </a:defRPr>
     </a:lvl9pPr>
   </p:defaultTextStyle>
+  <p:extLst>
+    <p:ext uri="{EFAFB233-063F-42B5-8137-9DF3F51BA10A}">
+      <p15:sldGuideLst xmlns:p15="http://schemas.microsoft.com/office/powerpoint/2012/main"/>
+    </p:ext>
+  </p:extLst>
 </p:presentation>
 </file>
 
@@ -193,7 +199,7 @@
           <a:p>
             <a:fld id="{CAF37081-4706-4B59-B34B-D228769C7BBA}" type="datetimeFigureOut">
               <a:rPr lang="hu-HU" smtClean="0"/>
-              <a:t>2022. 12. 03.</a:t>
+              <a:t>2023. 01. 09.</a:t>
             </a:fld>
             <a:endParaRPr lang="hu-HU"/>
           </a:p>
@@ -764,7 +770,7 @@
           <a:p>
             <a:fld id="{93B3E859-3201-4B43-BC4E-316714B90C3C}" type="datetimeFigureOut">
               <a:rPr lang="hu-HU" smtClean="0"/>
-              <a:t>2022. 12. 03.</a:t>
+              <a:t>2023. 01. 09.</a:t>
             </a:fld>
             <a:endParaRPr lang="hu-HU"/>
           </a:p>
@@ -962,7 +968,7 @@
           <a:p>
             <a:fld id="{93B3E859-3201-4B43-BC4E-316714B90C3C}" type="datetimeFigureOut">
               <a:rPr lang="hu-HU" smtClean="0"/>
-              <a:t>2022. 12. 03.</a:t>
+              <a:t>2023. 01. 09.</a:t>
             </a:fld>
             <a:endParaRPr lang="hu-HU"/>
           </a:p>
@@ -1170,7 +1176,7 @@
           <a:p>
             <a:fld id="{93B3E859-3201-4B43-BC4E-316714B90C3C}" type="datetimeFigureOut">
               <a:rPr lang="hu-HU" smtClean="0"/>
-              <a:t>2022. 12. 03.</a:t>
+              <a:t>2023. 01. 09.</a:t>
             </a:fld>
             <a:endParaRPr lang="hu-HU"/>
           </a:p>
@@ -1368,7 +1374,7 @@
           <a:p>
             <a:fld id="{93B3E859-3201-4B43-BC4E-316714B90C3C}" type="datetimeFigureOut">
               <a:rPr lang="hu-HU" smtClean="0"/>
-              <a:t>2022. 12. 03.</a:t>
+              <a:t>2023. 01. 09.</a:t>
             </a:fld>
             <a:endParaRPr lang="hu-HU"/>
           </a:p>
@@ -1643,7 +1649,7 @@
           <a:p>
             <a:fld id="{93B3E859-3201-4B43-BC4E-316714B90C3C}" type="datetimeFigureOut">
               <a:rPr lang="hu-HU" smtClean="0"/>
-              <a:t>2022. 12. 03.</a:t>
+              <a:t>2023. 01. 09.</a:t>
             </a:fld>
             <a:endParaRPr lang="hu-HU"/>
           </a:p>
@@ -1908,7 +1914,7 @@
           <a:p>
             <a:fld id="{93B3E859-3201-4B43-BC4E-316714B90C3C}" type="datetimeFigureOut">
               <a:rPr lang="hu-HU" smtClean="0"/>
-              <a:t>2022. 12. 03.</a:t>
+              <a:t>2023. 01. 09.</a:t>
             </a:fld>
             <a:endParaRPr lang="hu-HU"/>
           </a:p>
@@ -2320,7 +2326,7 @@
           <a:p>
             <a:fld id="{93B3E859-3201-4B43-BC4E-316714B90C3C}" type="datetimeFigureOut">
               <a:rPr lang="hu-HU" smtClean="0"/>
-              <a:t>2022. 12. 03.</a:t>
+              <a:t>2023. 01. 09.</a:t>
             </a:fld>
             <a:endParaRPr lang="hu-HU"/>
           </a:p>
@@ -2461,7 +2467,7 @@
           <a:p>
             <a:fld id="{93B3E859-3201-4B43-BC4E-316714B90C3C}" type="datetimeFigureOut">
               <a:rPr lang="hu-HU" smtClean="0"/>
-              <a:t>2022. 12. 03.</a:t>
+              <a:t>2023. 01. 09.</a:t>
             </a:fld>
             <a:endParaRPr lang="hu-HU"/>
           </a:p>
@@ -2574,7 +2580,7 @@
           <a:p>
             <a:fld id="{93B3E859-3201-4B43-BC4E-316714B90C3C}" type="datetimeFigureOut">
               <a:rPr lang="hu-HU" smtClean="0"/>
-              <a:t>2022. 12. 03.</a:t>
+              <a:t>2023. 01. 09.</a:t>
             </a:fld>
             <a:endParaRPr lang="hu-HU"/>
           </a:p>
@@ -2885,7 +2891,7 @@
           <a:p>
             <a:fld id="{93B3E859-3201-4B43-BC4E-316714B90C3C}" type="datetimeFigureOut">
               <a:rPr lang="hu-HU" smtClean="0"/>
-              <a:t>2022. 12. 03.</a:t>
+              <a:t>2023. 01. 09.</a:t>
             </a:fld>
             <a:endParaRPr lang="hu-HU"/>
           </a:p>
@@ -3173,7 +3179,7 @@
           <a:p>
             <a:fld id="{93B3E859-3201-4B43-BC4E-316714B90C3C}" type="datetimeFigureOut">
               <a:rPr lang="hu-HU" smtClean="0"/>
-              <a:t>2022. 12. 03.</a:t>
+              <a:t>2023. 01. 09.</a:t>
             </a:fld>
             <a:endParaRPr lang="hu-HU"/>
           </a:p>
@@ -3414,7 +3420,7 @@
           <a:p>
             <a:fld id="{93B3E859-3201-4B43-BC4E-316714B90C3C}" type="datetimeFigureOut">
               <a:rPr lang="hu-HU" smtClean="0"/>
-              <a:t>2022. 12. 03.</a:t>
+              <a:t>2023. 01. 09.</a:t>
             </a:fld>
             <a:endParaRPr lang="hu-HU"/>
           </a:p>
@@ -4609,6 +4615,255 @@
       </p:par>
     </p:tnLst>
   </p:timing>
+</p:sld>
+</file>
+
+<file path=ppt/slides/slide3.xml><?xml version="1.0" encoding="utf-8"?>
+<p:sld xmlns:a="http://schemas.openxmlformats.org/drawingml/2006/main" xmlns:r="http://schemas.openxmlformats.org/officeDocument/2006/relationships" xmlns:p="http://schemas.openxmlformats.org/presentationml/2006/main">
+  <p:cSld>
+    <p:spTree>
+      <p:nvGrpSpPr>
+        <p:cNvPr id="1" name=""/>
+        <p:cNvGrpSpPr/>
+        <p:nvPr/>
+      </p:nvGrpSpPr>
+      <p:grpSpPr>
+        <a:xfrm>
+          <a:off x="0" y="0"/>
+          <a:ext cx="0" cy="0"/>
+          <a:chOff x="0" y="0"/>
+          <a:chExt cx="0" cy="0"/>
+        </a:xfrm>
+      </p:grpSpPr>
+      <p:sp>
+        <p:nvSpPr>
+          <p:cNvPr id="2" name="Cím 1">
+            <a:extLst>
+              <a:ext uri="{FF2B5EF4-FFF2-40B4-BE49-F238E27FC236}">
+                <a16:creationId xmlns:a16="http://schemas.microsoft.com/office/drawing/2014/main" id="{5AB9A1AB-3CDD-E7FC-D0D5-5041BB8AFE2C}"/>
+              </a:ext>
+            </a:extLst>
+          </p:cNvPr>
+          <p:cNvSpPr>
+            <a:spLocks noGrp="1"/>
+          </p:cNvSpPr>
+          <p:nvPr>
+            <p:ph type="title"/>
+          </p:nvPr>
+        </p:nvSpPr>
+        <p:spPr/>
+        <p:txBody>
+          <a:bodyPr/>
+          <a:lstStyle/>
+          <a:p>
+            <a:r>
+              <a:rPr lang="hu-HU" dirty="0"/>
+              <a:t>Linux &lt;-&gt; Windows</a:t>
+            </a:r>
+          </a:p>
+        </p:txBody>
+      </p:sp>
+      <p:graphicFrame>
+        <p:nvGraphicFramePr>
+          <p:cNvPr id="4" name="Táblázat 4">
+            <a:extLst>
+              <a:ext uri="{FF2B5EF4-FFF2-40B4-BE49-F238E27FC236}">
+                <a16:creationId xmlns:a16="http://schemas.microsoft.com/office/drawing/2014/main" id="{00E2A863-0773-E68F-ABB4-1CEA0BA010A2}"/>
+              </a:ext>
+            </a:extLst>
+          </p:cNvPr>
+          <p:cNvGraphicFramePr>
+            <a:graphicFrameLocks noGrp="1"/>
+          </p:cNvGraphicFramePr>
+          <p:nvPr>
+            <p:ph idx="1"/>
+            <p:extLst>
+              <p:ext uri="{D42A27DB-BD31-4B8C-83A1-F6EECF244321}">
+                <p14:modId xmlns:p14="http://schemas.microsoft.com/office/powerpoint/2010/main" val="3123923417"/>
+              </p:ext>
+            </p:extLst>
+          </p:nvPr>
+        </p:nvGraphicFramePr>
+        <p:xfrm>
+          <a:off x="838200" y="1825625"/>
+          <a:ext cx="10515600" cy="3015023"/>
+        </p:xfrm>
+        <a:graphic>
+          <a:graphicData uri="http://schemas.openxmlformats.org/drawingml/2006/table">
+            <a:tbl>
+              <a:tblPr firstRow="1" bandRow="1">
+                <a:tableStyleId>{5C22544A-7EE6-4342-B048-85BDC9FD1C3A}</a:tableStyleId>
+              </a:tblPr>
+              <a:tblGrid>
+                <a:gridCol w="5257800">
+                  <a:extLst>
+                    <a:ext uri="{9D8B030D-6E8A-4147-A177-3AD203B41FA5}">
+                      <a16:colId xmlns:a16="http://schemas.microsoft.com/office/drawing/2014/main" val="3793491458"/>
+                    </a:ext>
+                  </a:extLst>
+                </a:gridCol>
+                <a:gridCol w="5257800">
+                  <a:extLst>
+                    <a:ext uri="{9D8B030D-6E8A-4147-A177-3AD203B41FA5}">
+                      <a16:colId xmlns:a16="http://schemas.microsoft.com/office/drawing/2014/main" val="2241206831"/>
+                    </a:ext>
+                  </a:extLst>
+                </a:gridCol>
+              </a:tblGrid>
+              <a:tr h="547141">
+                <a:tc>
+                  <a:txBody>
+                    <a:bodyPr/>
+                    <a:lstStyle/>
+                    <a:p>
+                      <a:r>
+                        <a:rPr lang="hu-HU" sz="3200" dirty="0"/>
+                        <a:t>Linux	</a:t>
+                      </a:r>
+                    </a:p>
+                  </a:txBody>
+                  <a:tcPr/>
+                </a:tc>
+                <a:tc>
+                  <a:txBody>
+                    <a:bodyPr/>
+                    <a:lstStyle/>
+                    <a:p>
+                      <a:r>
+                        <a:rPr lang="hu-HU" sz="3200" dirty="0"/>
+                        <a:t>Windows</a:t>
+                      </a:r>
+                    </a:p>
+                  </a:txBody>
+                  <a:tcPr/>
+                </a:tc>
+                <a:extLst>
+                  <a:ext uri="{0D108BD9-81ED-4DB2-BD59-A6C34878D82A}">
+                    <a16:rowId xmlns:a16="http://schemas.microsoft.com/office/drawing/2014/main" val="1176780629"/>
+                  </a:ext>
+                </a:extLst>
+              </a:tr>
+              <a:tr h="547141">
+                <a:tc>
+                  <a:txBody>
+                    <a:bodyPr/>
+                    <a:lstStyle/>
+                    <a:p>
+                      <a:r>
+                        <a:rPr lang="hu-HU" sz="2400" dirty="0"/>
+                        <a:t>ingyen van</a:t>
+                      </a:r>
+                    </a:p>
+                  </a:txBody>
+                  <a:tcPr/>
+                </a:tc>
+                <a:tc>
+                  <a:txBody>
+                    <a:bodyPr/>
+                    <a:lstStyle/>
+                    <a:p>
+                      <a:r>
+                        <a:rPr lang="hu-HU" sz="2400" dirty="0"/>
+                        <a:t>nagyon drága</a:t>
+                      </a:r>
+                    </a:p>
+                  </a:txBody>
+                  <a:tcPr/>
+                </a:tc>
+                <a:extLst>
+                  <a:ext uri="{0D108BD9-81ED-4DB2-BD59-A6C34878D82A}">
+                    <a16:rowId xmlns:a16="http://schemas.microsoft.com/office/drawing/2014/main" val="3368869875"/>
+                  </a:ext>
+                </a:extLst>
+              </a:tr>
+              <a:tr h="944381">
+                <a:tc>
+                  <a:txBody>
+                    <a:bodyPr/>
+                    <a:lstStyle/>
+                    <a:p>
+                      <a:r>
+                        <a:rPr lang="hu-HU" sz="2400" dirty="0"/>
+                        <a:t>Bármit megenged, de le lehet korlátozni biztonsági szempontokból</a:t>
+                      </a:r>
+                    </a:p>
+                  </a:txBody>
+                  <a:tcPr/>
+                </a:tc>
+                <a:tc>
+                  <a:txBody>
+                    <a:bodyPr/>
+                    <a:lstStyle/>
+                    <a:p>
+                      <a:r>
+                        <a:rPr lang="hu-HU" sz="2400" dirty="0"/>
+                        <a:t>Nem enged meg mindent, és nem lehet engedélyezni minden funkciót</a:t>
+                      </a:r>
+                    </a:p>
+                  </a:txBody>
+                  <a:tcPr/>
+                </a:tc>
+                <a:extLst>
+                  <a:ext uri="{0D108BD9-81ED-4DB2-BD59-A6C34878D82A}">
+                    <a16:rowId xmlns:a16="http://schemas.microsoft.com/office/drawing/2014/main" val="3990995443"/>
+                  </a:ext>
+                </a:extLst>
+              </a:tr>
+              <a:tr h="944381">
+                <a:tc>
+                  <a:txBody>
+                    <a:bodyPr/>
+                    <a:lstStyle/>
+                    <a:p>
+                      <a:r>
+                        <a:rPr lang="hu-HU" sz="2400" dirty="0"/>
+                        <a:t>mivel kevesen használják szinte egyáltalán nincs rá vírus</a:t>
+                      </a:r>
+                    </a:p>
+                  </a:txBody>
+                  <a:tcPr/>
+                </a:tc>
+                <a:tc>
+                  <a:txBody>
+                    <a:bodyPr/>
+                    <a:lstStyle/>
+                    <a:p>
+                      <a:r>
+                        <a:rPr lang="hu-HU" sz="2400" dirty="0"/>
+                        <a:t>Szinte mindenki </a:t>
+                      </a:r>
+                      <a:r>
+                        <a:rPr lang="hu-HU" sz="2400" dirty="0" err="1"/>
+                        <a:t>windows</a:t>
+                      </a:r>
+                      <a:r>
+                        <a:rPr lang="hu-HU" sz="2400" dirty="0"/>
+                        <a:t> -t használ ezért rengeteg vírust írnak rá</a:t>
+                      </a:r>
+                    </a:p>
+                  </a:txBody>
+                  <a:tcPr/>
+                </a:tc>
+                <a:extLst>
+                  <a:ext uri="{0D108BD9-81ED-4DB2-BD59-A6C34878D82A}">
+                    <a16:rowId xmlns:a16="http://schemas.microsoft.com/office/drawing/2014/main" val="2878483742"/>
+                  </a:ext>
+                </a:extLst>
+              </a:tr>
+            </a:tbl>
+          </a:graphicData>
+        </a:graphic>
+      </p:graphicFrame>
+    </p:spTree>
+    <p:extLst>
+      <p:ext uri="{BB962C8B-B14F-4D97-AF65-F5344CB8AC3E}">
+        <p14:creationId xmlns:p14="http://schemas.microsoft.com/office/powerpoint/2010/main" val="2527074209"/>
+      </p:ext>
+    </p:extLst>
+  </p:cSld>
+  <p:clrMapOvr>
+    <a:masterClrMapping/>
+  </p:clrMapOvr>
 </p:sld>
 </file>
 

</xml_diff>

<commit_message>
Linux bemutatás dia elkezdve
</commit_message>
<xml_diff>
--- a/Penguin electronicks.pptx
+++ b/Penguin electronicks.pptx
@@ -5,12 +5,13 @@
     <p:sldMasterId id="2147483648" r:id="rId1"/>
   </p:sldMasterIdLst>
   <p:notesMasterIdLst>
-    <p:notesMasterId r:id="rId5"/>
+    <p:notesMasterId r:id="rId6"/>
   </p:notesMasterIdLst>
   <p:sldIdLst>
     <p:sldId id="256" r:id="rId2"/>
     <p:sldId id="257" r:id="rId3"/>
     <p:sldId id="258" r:id="rId4"/>
+    <p:sldId id="259" r:id="rId5"/>
   </p:sldIdLst>
   <p:sldSz cx="12192000" cy="6858000"/>
   <p:notesSz cx="6858000" cy="9144000"/>
@@ -614,6 +615,128 @@
     <p:extLst>
       <p:ext uri="{BB962C8B-B14F-4D97-AF65-F5344CB8AC3E}">
         <p14:creationId xmlns:p14="http://schemas.microsoft.com/office/powerpoint/2010/main" val="1126047806"/>
+      </p:ext>
+    </p:extLst>
+  </p:cSld>
+  <p:clrMapOvr>
+    <a:masterClrMapping/>
+  </p:clrMapOvr>
+</p:notes>
+</file>
+
+<file path=ppt/notesSlides/notesSlide2.xml><?xml version="1.0" encoding="utf-8"?>
+<p:notes xmlns:a="http://schemas.openxmlformats.org/drawingml/2006/main" xmlns:r="http://schemas.openxmlformats.org/officeDocument/2006/relationships" xmlns:p="http://schemas.openxmlformats.org/presentationml/2006/main">
+  <p:cSld>
+    <p:spTree>
+      <p:nvGrpSpPr>
+        <p:cNvPr id="1" name=""/>
+        <p:cNvGrpSpPr/>
+        <p:nvPr/>
+      </p:nvGrpSpPr>
+      <p:grpSpPr>
+        <a:xfrm>
+          <a:off x="0" y="0"/>
+          <a:ext cx="0" cy="0"/>
+          <a:chOff x="0" y="0"/>
+          <a:chExt cx="0" cy="0"/>
+        </a:xfrm>
+      </p:grpSpPr>
+      <p:sp>
+        <p:nvSpPr>
+          <p:cNvPr id="2" name="Diakép helye 1"/>
+          <p:cNvSpPr>
+            <a:spLocks noGrp="1" noRot="1" noChangeAspect="1"/>
+          </p:cNvSpPr>
+          <p:nvPr>
+            <p:ph type="sldImg"/>
+          </p:nvPr>
+        </p:nvSpPr>
+        <p:spPr/>
+      </p:sp>
+      <p:sp>
+        <p:nvSpPr>
+          <p:cNvPr id="3" name="Jegyzetek helye 2"/>
+          <p:cNvSpPr>
+            <a:spLocks noGrp="1"/>
+          </p:cNvSpPr>
+          <p:nvPr>
+            <p:ph type="body" idx="1"/>
+          </p:nvPr>
+        </p:nvSpPr>
+        <p:spPr/>
+        <p:txBody>
+          <a:bodyPr/>
+          <a:lstStyle/>
+          <a:p>
+            <a:r>
+              <a:rPr lang="hu-HU" dirty="0"/>
+              <a:t>Egy része könnyen használható például az Ubuntu (ezt fogjuk telepíteni a cég </a:t>
+            </a:r>
+            <a:r>
+              <a:rPr lang="hu-HU" dirty="0" err="1"/>
+              <a:t>számítógépeire</a:t>
+            </a:r>
+            <a:r>
+              <a:rPr lang="hu-HU" dirty="0"/>
+              <a:t>). </a:t>
+            </a:r>
+            <a:br>
+              <a:rPr lang="hu-HU" dirty="0"/>
+            </a:br>
+            <a:r>
+              <a:rPr lang="hu-HU" dirty="0"/>
+              <a:t>A </a:t>
+            </a:r>
+            <a:r>
+              <a:rPr lang="hu-HU" dirty="0" err="1"/>
+              <a:t>linuxot</a:t>
+            </a:r>
+            <a:r>
+              <a:rPr lang="hu-HU" dirty="0"/>
+              <a:t> stabilitása miatt gyakran használják szerverekhez, ellenben elég kevesen választják mindennapi operációs rendszernek. </a:t>
+            </a:r>
+            <a:br>
+              <a:rPr lang="hu-HU" dirty="0"/>
+            </a:br>
+            <a:r>
+              <a:rPr lang="hu-HU" dirty="0"/>
+              <a:t>Ezáltal gyakorlatilag nem </a:t>
+            </a:r>
+            <a:r>
+              <a:rPr lang="hu-HU"/>
+              <a:t>készítenek vírusokat rá.</a:t>
+            </a:r>
+            <a:endParaRPr lang="hu-HU" dirty="0"/>
+          </a:p>
+        </p:txBody>
+      </p:sp>
+      <p:sp>
+        <p:nvSpPr>
+          <p:cNvPr id="4" name="Dia számának helye 3"/>
+          <p:cNvSpPr>
+            <a:spLocks noGrp="1"/>
+          </p:cNvSpPr>
+          <p:nvPr>
+            <p:ph type="sldNum" sz="quarter" idx="5"/>
+          </p:nvPr>
+        </p:nvSpPr>
+        <p:spPr/>
+        <p:txBody>
+          <a:bodyPr/>
+          <a:lstStyle/>
+          <a:p>
+            <a:fld id="{0A0666F1-CE42-42F9-87F5-3398015B499B}" type="slidenum">
+              <a:rPr lang="hu-HU" smtClean="0"/>
+              <a:t>4</a:t>
+            </a:fld>
+            <a:endParaRPr lang="hu-HU"/>
+          </a:p>
+        </p:txBody>
+      </p:sp>
+    </p:spTree>
+    <p:extLst>
+      <p:ext uri="{BB962C8B-B14F-4D97-AF65-F5344CB8AC3E}">
+        <p14:creationId xmlns:p14="http://schemas.microsoft.com/office/powerpoint/2010/main" val="2499213928"/>
       </p:ext>
     </p:extLst>
   </p:cSld>
@@ -4858,6 +4981,110 @@
     <p:extLst>
       <p:ext uri="{BB962C8B-B14F-4D97-AF65-F5344CB8AC3E}">
         <p14:creationId xmlns:p14="http://schemas.microsoft.com/office/powerpoint/2010/main" val="2527074209"/>
+      </p:ext>
+    </p:extLst>
+  </p:cSld>
+  <p:clrMapOvr>
+    <a:masterClrMapping/>
+  </p:clrMapOvr>
+</p:sld>
+</file>
+
+<file path=ppt/slides/slide4.xml><?xml version="1.0" encoding="utf-8"?>
+<p:sld xmlns:a="http://schemas.openxmlformats.org/drawingml/2006/main" xmlns:r="http://schemas.openxmlformats.org/officeDocument/2006/relationships" xmlns:p="http://schemas.openxmlformats.org/presentationml/2006/main">
+  <p:cSld>
+    <p:spTree>
+      <p:nvGrpSpPr>
+        <p:cNvPr id="1" name=""/>
+        <p:cNvGrpSpPr/>
+        <p:nvPr/>
+      </p:nvGrpSpPr>
+      <p:grpSpPr>
+        <a:xfrm>
+          <a:off x="0" y="0"/>
+          <a:ext cx="0" cy="0"/>
+          <a:chOff x="0" y="0"/>
+          <a:chExt cx="0" cy="0"/>
+        </a:xfrm>
+      </p:grpSpPr>
+      <p:sp>
+        <p:nvSpPr>
+          <p:cNvPr id="2" name="Cím 1">
+            <a:extLst>
+              <a:ext uri="{FF2B5EF4-FFF2-40B4-BE49-F238E27FC236}">
+                <a16:creationId xmlns:a16="http://schemas.microsoft.com/office/drawing/2014/main" id="{C9432085-0C48-2656-B99F-694C8F22263A}"/>
+              </a:ext>
+            </a:extLst>
+          </p:cNvPr>
+          <p:cNvSpPr>
+            <a:spLocks noGrp="1"/>
+          </p:cNvSpPr>
+          <p:nvPr>
+            <p:ph type="title"/>
+          </p:nvPr>
+        </p:nvSpPr>
+        <p:spPr/>
+        <p:txBody>
+          <a:bodyPr/>
+          <a:lstStyle/>
+          <a:p>
+            <a:r>
+              <a:rPr lang="hu-HU" dirty="0"/>
+              <a:t>Linux</a:t>
+            </a:r>
+          </a:p>
+        </p:txBody>
+      </p:sp>
+      <p:sp>
+        <p:nvSpPr>
+          <p:cNvPr id="3" name="Tartalom helye 2">
+            <a:extLst>
+              <a:ext uri="{FF2B5EF4-FFF2-40B4-BE49-F238E27FC236}">
+                <a16:creationId xmlns:a16="http://schemas.microsoft.com/office/drawing/2014/main" id="{746A02C2-258E-5A32-FAB7-5B2279DAC037}"/>
+              </a:ext>
+            </a:extLst>
+          </p:cNvPr>
+          <p:cNvSpPr>
+            <a:spLocks noGrp="1"/>
+          </p:cNvSpPr>
+          <p:nvPr>
+            <p:ph idx="1"/>
+          </p:nvPr>
+        </p:nvSpPr>
+        <p:spPr/>
+        <p:txBody>
+          <a:bodyPr/>
+          <a:lstStyle/>
+          <a:p>
+            <a:r>
+              <a:rPr lang="hu-HU" dirty="0"/>
+              <a:t>Ingyen van</a:t>
+            </a:r>
+          </a:p>
+          <a:p>
+            <a:r>
+              <a:rPr lang="hu-HU" dirty="0"/>
+              <a:t>Nem nehéz használni</a:t>
+            </a:r>
+          </a:p>
+          <a:p>
+            <a:r>
+              <a:rPr lang="hu-HU" dirty="0"/>
+              <a:t>Stabil</a:t>
+            </a:r>
+          </a:p>
+          <a:p>
+            <a:r>
+              <a:rPr lang="hu-HU" dirty="0"/>
+              <a:t>Szinte vírusmentes</a:t>
+            </a:r>
+          </a:p>
+        </p:txBody>
+      </p:sp>
+    </p:spTree>
+    <p:extLst>
+      <p:ext uri="{BB962C8B-B14F-4D97-AF65-F5344CB8AC3E}">
+        <p14:creationId xmlns:p14="http://schemas.microsoft.com/office/powerpoint/2010/main" val="946169913"/>
       </p:ext>
     </p:extLst>
   </p:cSld>

</xml_diff>